<commit_message>
Added extra buttons to the Mixing Coefficient tab
Signed-off-by: Lucas Van der Hauwaert <lucasvdhauwaert@gmail.com>
</commit_message>
<xml_diff>
--- a/src/outdoor/user_interface/dialogs/figures/Raw figure separation.pptx
+++ b/src/outdoor/user_interface/dialogs/figures/Raw figure separation.pptx
@@ -9,6 +9,7 @@
     <p:sldId id="260" r:id="rId3"/>
     <p:sldId id="258" r:id="rId4"/>
     <p:sldId id="259" r:id="rId5"/>
+    <p:sldId id="262" r:id="rId6"/>
   </p:sldIdLst>
   <p:sldSz cx="12192000" cy="6858000"/>
   <p:notesSz cx="6858000" cy="9144000"/>
@@ -264,7 +265,7 @@
           <a:p>
             <a:fld id="{FA993693-28F7-4266-AD24-0E51C2899D33}" type="datetimeFigureOut">
               <a:rPr lang="en-US" smtClean="0"/>
-              <a:t>10/22/2024</a:t>
+              <a:t>6/3/2025</a:t>
             </a:fld>
             <a:endParaRPr lang="en-US"/>
           </a:p>
@@ -464,7 +465,7 @@
           <a:p>
             <a:fld id="{FA993693-28F7-4266-AD24-0E51C2899D33}" type="datetimeFigureOut">
               <a:rPr lang="en-US" smtClean="0"/>
-              <a:t>10/22/2024</a:t>
+              <a:t>6/3/2025</a:t>
             </a:fld>
             <a:endParaRPr lang="en-US"/>
           </a:p>
@@ -674,7 +675,7 @@
           <a:p>
             <a:fld id="{FA993693-28F7-4266-AD24-0E51C2899D33}" type="datetimeFigureOut">
               <a:rPr lang="en-US" smtClean="0"/>
-              <a:t>10/22/2024</a:t>
+              <a:t>6/3/2025</a:t>
             </a:fld>
             <a:endParaRPr lang="en-US"/>
           </a:p>
@@ -874,7 +875,7 @@
           <a:p>
             <a:fld id="{FA993693-28F7-4266-AD24-0E51C2899D33}" type="datetimeFigureOut">
               <a:rPr lang="en-US" smtClean="0"/>
-              <a:t>10/22/2024</a:t>
+              <a:t>6/3/2025</a:t>
             </a:fld>
             <a:endParaRPr lang="en-US"/>
           </a:p>
@@ -1150,7 +1151,7 @@
           <a:p>
             <a:fld id="{FA993693-28F7-4266-AD24-0E51C2899D33}" type="datetimeFigureOut">
               <a:rPr lang="en-US" smtClean="0"/>
-              <a:t>10/22/2024</a:t>
+              <a:t>6/3/2025</a:t>
             </a:fld>
             <a:endParaRPr lang="en-US"/>
           </a:p>
@@ -1418,7 +1419,7 @@
           <a:p>
             <a:fld id="{FA993693-28F7-4266-AD24-0E51C2899D33}" type="datetimeFigureOut">
               <a:rPr lang="en-US" smtClean="0"/>
-              <a:t>10/22/2024</a:t>
+              <a:t>6/3/2025</a:t>
             </a:fld>
             <a:endParaRPr lang="en-US"/>
           </a:p>
@@ -1833,7 +1834,7 @@
           <a:p>
             <a:fld id="{FA993693-28F7-4266-AD24-0E51C2899D33}" type="datetimeFigureOut">
               <a:rPr lang="en-US" smtClean="0"/>
-              <a:t>10/22/2024</a:t>
+              <a:t>6/3/2025</a:t>
             </a:fld>
             <a:endParaRPr lang="en-US"/>
           </a:p>
@@ -1975,7 +1976,7 @@
           <a:p>
             <a:fld id="{FA993693-28F7-4266-AD24-0E51C2899D33}" type="datetimeFigureOut">
               <a:rPr lang="en-US" smtClean="0"/>
-              <a:t>10/22/2024</a:t>
+              <a:t>6/3/2025</a:t>
             </a:fld>
             <a:endParaRPr lang="en-US"/>
           </a:p>
@@ -2088,7 +2089,7 @@
           <a:p>
             <a:fld id="{FA993693-28F7-4266-AD24-0E51C2899D33}" type="datetimeFigureOut">
               <a:rPr lang="en-US" smtClean="0"/>
-              <a:t>10/22/2024</a:t>
+              <a:t>6/3/2025</a:t>
             </a:fld>
             <a:endParaRPr lang="en-US"/>
           </a:p>
@@ -2401,7 +2402,7 @@
           <a:p>
             <a:fld id="{FA993693-28F7-4266-AD24-0E51C2899D33}" type="datetimeFigureOut">
               <a:rPr lang="en-US" smtClean="0"/>
-              <a:t>10/22/2024</a:t>
+              <a:t>6/3/2025</a:t>
             </a:fld>
             <a:endParaRPr lang="en-US"/>
           </a:p>
@@ -2690,7 +2691,7 @@
           <a:p>
             <a:fld id="{FA993693-28F7-4266-AD24-0E51C2899D33}" type="datetimeFigureOut">
               <a:rPr lang="en-US" smtClean="0"/>
-              <a:t>10/22/2024</a:t>
+              <a:t>6/3/2025</a:t>
             </a:fld>
             <a:endParaRPr lang="en-US"/>
           </a:p>
@@ -2933,7 +2934,7 @@
           <a:p>
             <a:fld id="{FA993693-28F7-4266-AD24-0E51C2899D33}" type="datetimeFigureOut">
               <a:rPr lang="en-US" smtClean="0"/>
-              <a:t>10/22/2024</a:t>
+              <a:t>6/3/2025</a:t>
             </a:fld>
             <a:endParaRPr lang="en-US"/>
           </a:p>
@@ -3352,7 +3353,7 @@
       </p:grpSpPr>
       <p:sp>
         <p:nvSpPr>
-          <p:cNvPr id="4" name="Rectangle 3">
+          <p:cNvPr id="4" name="Rectangle: Rounded Corners 3">
             <a:extLst>
               <a:ext uri="{FF2B5EF4-FFF2-40B4-BE49-F238E27FC236}">
                 <a16:creationId xmlns:a16="http://schemas.microsoft.com/office/drawing/2014/main" id="{2C3C8FF1-8DE6-A6FF-9425-ACA6446619C2}"/>
@@ -3367,9 +3368,15 @@
             <a:off x="2604830" y="2425217"/>
             <a:ext cx="5006930" cy="2007566"/>
           </a:xfrm>
-          <a:prstGeom prst="rect">
+          <a:prstGeom prst="roundRect">
             <a:avLst/>
           </a:prstGeom>
+          <a:solidFill>
+            <a:schemeClr val="accent5">
+              <a:lumMod val="20000"/>
+              <a:lumOff val="80000"/>
+            </a:schemeClr>
+          </a:solidFill>
         </p:spPr>
         <p:style>
           <a:lnRef idx="2">
@@ -3393,7 +3400,11 @@
           <a:p>
             <a:pPr algn="ctr"/>
             <a:r>
-              <a:rPr lang="en-US" sz="4800"/>
+              <a:rPr lang="en-US" sz="4800" dirty="0">
+                <a:solidFill>
+                  <a:schemeClr val="tx1"/>
+                </a:solidFill>
+              </a:rPr>
               <a:t>Unit Process</a:t>
             </a:r>
           </a:p>
@@ -3698,7 +3709,7 @@
       </p:grpSpPr>
       <p:sp>
         <p:nvSpPr>
-          <p:cNvPr id="4" name="Rectangle 3">
+          <p:cNvPr id="4" name="Rectangle: Rounded Corners 3">
             <a:extLst>
               <a:ext uri="{FF2B5EF4-FFF2-40B4-BE49-F238E27FC236}">
                 <a16:creationId xmlns:a16="http://schemas.microsoft.com/office/drawing/2014/main" id="{D04E36E7-538B-DF5F-E2E7-A1045F0AA823}"/>
@@ -3713,9 +3724,15 @@
             <a:off x="2604830" y="2425217"/>
             <a:ext cx="5006930" cy="2007566"/>
           </a:xfrm>
-          <a:prstGeom prst="rect">
+          <a:prstGeom prst="roundRect">
             <a:avLst/>
           </a:prstGeom>
+          <a:solidFill>
+            <a:schemeClr val="accent6">
+              <a:lumMod val="40000"/>
+              <a:lumOff val="60000"/>
+            </a:schemeClr>
+          </a:solidFill>
         </p:spPr>
         <p:style>
           <a:lnRef idx="2">
@@ -3739,7 +3756,11 @@
           <a:p>
             <a:pPr algn="ctr"/>
             <a:r>
-              <a:rPr lang="en-US" sz="4800"/>
+              <a:rPr lang="en-US" sz="4800" dirty="0">
+                <a:solidFill>
+                  <a:schemeClr val="tx1"/>
+                </a:solidFill>
+              </a:rPr>
               <a:t>Unit Process</a:t>
             </a:r>
           </a:p>
@@ -4172,7 +4193,7 @@
       </p:grpSpPr>
       <p:sp>
         <p:nvSpPr>
-          <p:cNvPr id="4" name="Rectangle 3">
+          <p:cNvPr id="4" name="Rectangle: Rounded Corners 3">
             <a:extLst>
               <a:ext uri="{FF2B5EF4-FFF2-40B4-BE49-F238E27FC236}">
                 <a16:creationId xmlns:a16="http://schemas.microsoft.com/office/drawing/2014/main" id="{42A983B1-DE6E-5552-01F7-784CCC9885B2}"/>
@@ -4187,9 +4208,12 @@
             <a:off x="2604830" y="2425217"/>
             <a:ext cx="5006930" cy="2007566"/>
           </a:xfrm>
-          <a:prstGeom prst="rect">
+          <a:prstGeom prst="roundRect">
             <a:avLst/>
           </a:prstGeom>
+          <a:solidFill>
+            <a:srgbClr val="FFFF99"/>
+          </a:solidFill>
         </p:spPr>
         <p:style>
           <a:lnRef idx="2">
@@ -4213,7 +4237,11 @@
           <a:p>
             <a:pPr algn="ctr"/>
             <a:r>
-              <a:rPr lang="en-US" sz="4800"/>
+              <a:rPr lang="en-US" sz="4800" dirty="0">
+                <a:solidFill>
+                  <a:schemeClr val="tx1"/>
+                </a:solidFill>
+              </a:rPr>
               <a:t>Unit Process</a:t>
             </a:r>
           </a:p>
@@ -4646,7 +4674,7 @@
       </p:grpSpPr>
       <p:sp>
         <p:nvSpPr>
-          <p:cNvPr id="4" name="Rectangle 3">
+          <p:cNvPr id="4" name="Rectangle: Rounded Corners 3">
             <a:extLst>
               <a:ext uri="{FF2B5EF4-FFF2-40B4-BE49-F238E27FC236}">
                 <a16:creationId xmlns:a16="http://schemas.microsoft.com/office/drawing/2014/main" id="{F785E863-C198-50EF-0902-47E3833F9260}"/>
@@ -4661,7 +4689,7 @@
             <a:off x="2604830" y="2425217"/>
             <a:ext cx="5006930" cy="2007566"/>
           </a:xfrm>
-          <a:prstGeom prst="rect">
+          <a:prstGeom prst="roundRect">
             <a:avLst/>
           </a:prstGeom>
         </p:spPr>
@@ -5214,6 +5242,601 @@
     <p:extLst>
       <p:ext uri="{BB962C8B-B14F-4D97-AF65-F5344CB8AC3E}">
         <p14:creationId xmlns:p14="http://schemas.microsoft.com/office/powerpoint/2010/main" val="1236394709"/>
+      </p:ext>
+    </p:extLst>
+  </p:cSld>
+  <p:clrMapOvr>
+    <a:masterClrMapping/>
+  </p:clrMapOvr>
+</p:sld>
+</file>
+
+<file path=ppt/slides/slide5.xml><?xml version="1.0" encoding="utf-8"?>
+<p:sld xmlns:a="http://schemas.openxmlformats.org/drawingml/2006/main" xmlns:r="http://schemas.openxmlformats.org/officeDocument/2006/relationships" xmlns:p="http://schemas.openxmlformats.org/presentationml/2006/main">
+  <p:cSld>
+    <p:spTree>
+      <p:nvGrpSpPr>
+        <p:cNvPr id="1" name="">
+          <a:extLst>
+            <a:ext uri="{FF2B5EF4-FFF2-40B4-BE49-F238E27FC236}">
+              <a16:creationId xmlns:a16="http://schemas.microsoft.com/office/drawing/2014/main" id="{87A70AF8-B8FD-3DD9-EE56-0CBD431F55CA}"/>
+            </a:ext>
+          </a:extLst>
+        </p:cNvPr>
+        <p:cNvGrpSpPr/>
+        <p:nvPr/>
+      </p:nvGrpSpPr>
+      <p:grpSpPr>
+        <a:xfrm>
+          <a:off x="0" y="0"/>
+          <a:ext cx="0" cy="0"/>
+          <a:chOff x="0" y="0"/>
+          <a:chExt cx="0" cy="0"/>
+        </a:xfrm>
+      </p:grpSpPr>
+      <p:sp>
+        <p:nvSpPr>
+          <p:cNvPr id="4" name="Rectangle: Rounded Corners 3">
+            <a:extLst>
+              <a:ext uri="{FF2B5EF4-FFF2-40B4-BE49-F238E27FC236}">
+                <a16:creationId xmlns:a16="http://schemas.microsoft.com/office/drawing/2014/main" id="{D61662AA-F111-1B00-176B-B5B189B811CF}"/>
+              </a:ext>
+            </a:extLst>
+          </p:cNvPr>
+          <p:cNvSpPr/>
+          <p:nvPr/>
+        </p:nvSpPr>
+        <p:spPr>
+          <a:xfrm>
+            <a:off x="5010572" y="3091117"/>
+            <a:ext cx="2881571" cy="1350254"/>
+          </a:xfrm>
+          <a:prstGeom prst="roundRect">
+            <a:avLst/>
+          </a:prstGeom>
+          <a:solidFill>
+            <a:schemeClr val="accent5">
+              <a:lumMod val="40000"/>
+              <a:lumOff val="60000"/>
+            </a:schemeClr>
+          </a:solidFill>
+        </p:spPr>
+        <p:style>
+          <a:lnRef idx="2">
+            <a:schemeClr val="accent1">
+              <a:shade val="15000"/>
+            </a:schemeClr>
+          </a:lnRef>
+          <a:fillRef idx="1">
+            <a:schemeClr val="accent1"/>
+          </a:fillRef>
+          <a:effectRef idx="0">
+            <a:schemeClr val="accent1"/>
+          </a:effectRef>
+          <a:fontRef idx="minor">
+            <a:schemeClr val="lt1"/>
+          </a:fontRef>
+        </p:style>
+        <p:txBody>
+          <a:bodyPr rtlCol="0" anchor="ctr"/>
+          <a:lstStyle/>
+          <a:p>
+            <a:pPr algn="ctr"/>
+            <a:r>
+              <a:rPr lang="en-US" sz="4400" dirty="0">
+                <a:solidFill>
+                  <a:sysClr val="windowText" lastClr="000000"/>
+                </a:solidFill>
+              </a:rPr>
+              <a:t>Unit Process</a:t>
+            </a:r>
+          </a:p>
+        </p:txBody>
+      </p:sp>
+      <p:sp>
+        <p:nvSpPr>
+          <p:cNvPr id="6" name="Oval 5">
+            <a:extLst>
+              <a:ext uri="{FF2B5EF4-FFF2-40B4-BE49-F238E27FC236}">
+                <a16:creationId xmlns:a16="http://schemas.microsoft.com/office/drawing/2014/main" id="{9636BAF9-18D4-7E93-F9DA-B790D566BCED}"/>
+              </a:ext>
+            </a:extLst>
+          </p:cNvPr>
+          <p:cNvSpPr/>
+          <p:nvPr/>
+        </p:nvSpPr>
+        <p:spPr>
+          <a:xfrm>
+            <a:off x="7892143" y="3624942"/>
+            <a:ext cx="457200" cy="413657"/>
+          </a:xfrm>
+          <a:prstGeom prst="ellipse">
+            <a:avLst/>
+          </a:prstGeom>
+          <a:solidFill>
+            <a:schemeClr val="accent5"/>
+          </a:solidFill>
+        </p:spPr>
+        <p:style>
+          <a:lnRef idx="2">
+            <a:schemeClr val="accent1">
+              <a:shade val="15000"/>
+            </a:schemeClr>
+          </a:lnRef>
+          <a:fillRef idx="1">
+            <a:schemeClr val="accent1"/>
+          </a:fillRef>
+          <a:effectRef idx="0">
+            <a:schemeClr val="accent1"/>
+          </a:effectRef>
+          <a:fontRef idx="minor">
+            <a:schemeClr val="lt1"/>
+          </a:fontRef>
+        </p:style>
+        <p:txBody>
+          <a:bodyPr rtlCol="0" anchor="ctr"/>
+          <a:lstStyle/>
+          <a:p>
+            <a:pPr algn="ctr"/>
+            <a:endParaRPr lang="en-US"/>
+          </a:p>
+        </p:txBody>
+      </p:sp>
+      <p:sp>
+        <p:nvSpPr>
+          <p:cNvPr id="8" name="Oval 7">
+            <a:extLst>
+              <a:ext uri="{FF2B5EF4-FFF2-40B4-BE49-F238E27FC236}">
+                <a16:creationId xmlns:a16="http://schemas.microsoft.com/office/drawing/2014/main" id="{23B8EA57-B043-E337-09B3-27412383A777}"/>
+              </a:ext>
+            </a:extLst>
+          </p:cNvPr>
+          <p:cNvSpPr/>
+          <p:nvPr/>
+        </p:nvSpPr>
+        <p:spPr>
+          <a:xfrm>
+            <a:off x="4553372" y="3624942"/>
+            <a:ext cx="457200" cy="413657"/>
+          </a:xfrm>
+          <a:prstGeom prst="ellipse">
+            <a:avLst/>
+          </a:prstGeom>
+          <a:solidFill>
+            <a:schemeClr val="accent6"/>
+          </a:solidFill>
+        </p:spPr>
+        <p:style>
+          <a:lnRef idx="2">
+            <a:schemeClr val="accent1">
+              <a:shade val="15000"/>
+            </a:schemeClr>
+          </a:lnRef>
+          <a:fillRef idx="1">
+            <a:schemeClr val="accent1"/>
+          </a:fillRef>
+          <a:effectRef idx="0">
+            <a:schemeClr val="accent1"/>
+          </a:effectRef>
+          <a:fontRef idx="minor">
+            <a:schemeClr val="lt1"/>
+          </a:fontRef>
+        </p:style>
+        <p:txBody>
+          <a:bodyPr rtlCol="0" anchor="ctr"/>
+          <a:lstStyle/>
+          <a:p>
+            <a:pPr algn="ctr"/>
+            <a:endParaRPr lang="en-US"/>
+          </a:p>
+        </p:txBody>
+      </p:sp>
+      <p:cxnSp>
+        <p:nvCxnSpPr>
+          <p:cNvPr id="10" name="Straight Arrow Connector 9">
+            <a:extLst>
+              <a:ext uri="{FF2B5EF4-FFF2-40B4-BE49-F238E27FC236}">
+                <a16:creationId xmlns:a16="http://schemas.microsoft.com/office/drawing/2014/main" id="{71A226E7-5948-CBDD-BF04-1D63FE55109A}"/>
+              </a:ext>
+            </a:extLst>
+          </p:cNvPr>
+          <p:cNvCxnSpPr>
+            <a:cxnSpLocks/>
+            <a:stCxn id="3" idx="3"/>
+            <a:endCxn id="8" idx="1"/>
+          </p:cNvCxnSpPr>
+          <p:nvPr/>
+        </p:nvCxnSpPr>
+        <p:spPr>
+          <a:xfrm>
+            <a:off x="3177514" y="2605976"/>
+            <a:ext cx="1442813" cy="1079545"/>
+          </a:xfrm>
+          <a:prstGeom prst="straightConnector1">
+            <a:avLst/>
+          </a:prstGeom>
+          <a:ln w="76200">
+            <a:solidFill>
+              <a:schemeClr val="accent1"/>
+            </a:solidFill>
+            <a:tailEnd type="triangle"/>
+          </a:ln>
+        </p:spPr>
+        <p:style>
+          <a:lnRef idx="2">
+            <a:schemeClr val="accent1"/>
+          </a:lnRef>
+          <a:fillRef idx="0">
+            <a:schemeClr val="accent1"/>
+          </a:fillRef>
+          <a:effectRef idx="1">
+            <a:schemeClr val="accent1"/>
+          </a:effectRef>
+          <a:fontRef idx="minor">
+            <a:schemeClr val="tx1"/>
+          </a:fontRef>
+        </p:style>
+      </p:cxnSp>
+      <p:sp>
+        <p:nvSpPr>
+          <p:cNvPr id="19" name="TextBox 18">
+            <a:extLst>
+              <a:ext uri="{FF2B5EF4-FFF2-40B4-BE49-F238E27FC236}">
+                <a16:creationId xmlns:a16="http://schemas.microsoft.com/office/drawing/2014/main" id="{86EFBFDD-DEEE-91C4-FC24-D0169B557001}"/>
+              </a:ext>
+            </a:extLst>
+          </p:cNvPr>
+          <p:cNvSpPr txBox="1"/>
+          <p:nvPr/>
+        </p:nvSpPr>
+        <p:spPr>
+          <a:xfrm>
+            <a:off x="8120743" y="4038599"/>
+            <a:ext cx="1676400" cy="646331"/>
+          </a:xfrm>
+          <a:prstGeom prst="rect">
+            <a:avLst/>
+          </a:prstGeom>
+          <a:noFill/>
+        </p:spPr>
+        <p:txBody>
+          <a:bodyPr wrap="square" rtlCol="0">
+            <a:spAutoFit/>
+          </a:bodyPr>
+          <a:lstStyle/>
+          <a:p>
+            <a:r>
+              <a:rPr lang="en-GB" sz="3600" b="1" i="1" dirty="0"/>
+              <a:t>Outlet</a:t>
+            </a:r>
+          </a:p>
+        </p:txBody>
+      </p:sp>
+      <p:cxnSp>
+        <p:nvCxnSpPr>
+          <p:cNvPr id="22" name="Straight Arrow Connector 21">
+            <a:extLst>
+              <a:ext uri="{FF2B5EF4-FFF2-40B4-BE49-F238E27FC236}">
+                <a16:creationId xmlns:a16="http://schemas.microsoft.com/office/drawing/2014/main" id="{3DD8E9A5-FC95-51CF-0159-8D5DD4D31802}"/>
+              </a:ext>
+            </a:extLst>
+          </p:cNvPr>
+          <p:cNvCxnSpPr>
+            <a:cxnSpLocks/>
+            <a:stCxn id="6" idx="6"/>
+          </p:cNvCxnSpPr>
+          <p:nvPr/>
+        </p:nvCxnSpPr>
+        <p:spPr>
+          <a:xfrm>
+            <a:off x="8349343" y="3831771"/>
+            <a:ext cx="1401611" cy="0"/>
+          </a:xfrm>
+          <a:prstGeom prst="straightConnector1">
+            <a:avLst/>
+          </a:prstGeom>
+          <a:ln w="76200">
+            <a:solidFill>
+              <a:schemeClr val="accent4"/>
+            </a:solidFill>
+            <a:tailEnd type="triangle"/>
+          </a:ln>
+        </p:spPr>
+        <p:style>
+          <a:lnRef idx="2">
+            <a:schemeClr val="accent1"/>
+          </a:lnRef>
+          <a:fillRef idx="0">
+            <a:schemeClr val="accent1"/>
+          </a:fillRef>
+          <a:effectRef idx="1">
+            <a:schemeClr val="accent1"/>
+          </a:effectRef>
+          <a:fontRef idx="minor">
+            <a:schemeClr val="tx1"/>
+          </a:fontRef>
+        </p:style>
+      </p:cxnSp>
+      <p:sp>
+        <p:nvSpPr>
+          <p:cNvPr id="3" name="Rectangle: Rounded Corners 2">
+            <a:extLst>
+              <a:ext uri="{FF2B5EF4-FFF2-40B4-BE49-F238E27FC236}">
+                <a16:creationId xmlns:a16="http://schemas.microsoft.com/office/drawing/2014/main" id="{B669810C-BDD5-8283-4E75-5E6FF092F319}"/>
+              </a:ext>
+            </a:extLst>
+          </p:cNvPr>
+          <p:cNvSpPr/>
+          <p:nvPr/>
+        </p:nvSpPr>
+        <p:spPr>
+          <a:xfrm>
+            <a:off x="230593" y="1948115"/>
+            <a:ext cx="2946921" cy="1315722"/>
+          </a:xfrm>
+          <a:prstGeom prst="roundRect">
+            <a:avLst/>
+          </a:prstGeom>
+          <a:solidFill>
+            <a:schemeClr val="accent4">
+              <a:lumMod val="40000"/>
+              <a:lumOff val="60000"/>
+            </a:schemeClr>
+          </a:solidFill>
+        </p:spPr>
+        <p:style>
+          <a:lnRef idx="2">
+            <a:schemeClr val="accent1">
+              <a:shade val="15000"/>
+            </a:schemeClr>
+          </a:lnRef>
+          <a:fillRef idx="1">
+            <a:schemeClr val="accent1"/>
+          </a:fillRef>
+          <a:effectRef idx="0">
+            <a:schemeClr val="accent1"/>
+          </a:effectRef>
+          <a:fontRef idx="minor">
+            <a:schemeClr val="lt1"/>
+          </a:fontRef>
+        </p:style>
+        <p:txBody>
+          <a:bodyPr rtlCol="0" anchor="ctr"/>
+          <a:lstStyle/>
+          <a:p>
+            <a:pPr algn="ctr"/>
+            <a:r>
+              <a:rPr lang="en-US" sz="4400" dirty="0">
+                <a:solidFill>
+                  <a:schemeClr val="tx1"/>
+                </a:solidFill>
+              </a:rPr>
+              <a:t> Unit 1</a:t>
+            </a:r>
+          </a:p>
+          <a:p>
+            <a:pPr algn="ctr"/>
+            <a:r>
+              <a:rPr lang="en-US" sz="3200" dirty="0">
+                <a:solidFill>
+                  <a:schemeClr val="tx1"/>
+                </a:solidFill>
+              </a:rPr>
+              <a:t>e.g., Input</a:t>
+            </a:r>
+          </a:p>
+        </p:txBody>
+      </p:sp>
+      <p:sp>
+        <p:nvSpPr>
+          <p:cNvPr id="11" name="Rectangle: Rounded Corners 10">
+            <a:extLst>
+              <a:ext uri="{FF2B5EF4-FFF2-40B4-BE49-F238E27FC236}">
+                <a16:creationId xmlns:a16="http://schemas.microsoft.com/office/drawing/2014/main" id="{C2A528A6-D372-D315-41C3-A3E86084AF94}"/>
+              </a:ext>
+            </a:extLst>
+          </p:cNvPr>
+          <p:cNvSpPr/>
+          <p:nvPr/>
+        </p:nvSpPr>
+        <p:spPr>
+          <a:xfrm>
+            <a:off x="230593" y="4382085"/>
+            <a:ext cx="2946921" cy="1315722"/>
+          </a:xfrm>
+          <a:prstGeom prst="roundRect">
+            <a:avLst/>
+          </a:prstGeom>
+          <a:solidFill>
+            <a:schemeClr val="accent3">
+              <a:lumMod val="20000"/>
+              <a:lumOff val="80000"/>
+            </a:schemeClr>
+          </a:solidFill>
+        </p:spPr>
+        <p:style>
+          <a:lnRef idx="2">
+            <a:schemeClr val="accent1">
+              <a:shade val="15000"/>
+            </a:schemeClr>
+          </a:lnRef>
+          <a:fillRef idx="1">
+            <a:schemeClr val="accent1"/>
+          </a:fillRef>
+          <a:effectRef idx="0">
+            <a:schemeClr val="accent1"/>
+          </a:effectRef>
+          <a:fontRef idx="minor">
+            <a:schemeClr val="lt1"/>
+          </a:fontRef>
+        </p:style>
+        <p:txBody>
+          <a:bodyPr rtlCol="0" anchor="ctr"/>
+          <a:lstStyle/>
+          <a:p>
+            <a:pPr algn="ctr"/>
+            <a:r>
+              <a:rPr lang="en-US" sz="4400" dirty="0">
+                <a:solidFill>
+                  <a:sysClr val="windowText" lastClr="000000"/>
+                </a:solidFill>
+              </a:rPr>
+              <a:t>Unit 2</a:t>
+            </a:r>
+          </a:p>
+          <a:p>
+            <a:pPr algn="ctr"/>
+            <a:r>
+              <a:rPr lang="en-US" sz="3400" dirty="0">
+                <a:solidFill>
+                  <a:sysClr val="windowText" lastClr="000000"/>
+                </a:solidFill>
+              </a:rPr>
+              <a:t>e.g., Reactor</a:t>
+            </a:r>
+          </a:p>
+        </p:txBody>
+      </p:sp>
+      <p:cxnSp>
+        <p:nvCxnSpPr>
+          <p:cNvPr id="15" name="Straight Arrow Connector 14">
+            <a:extLst>
+              <a:ext uri="{FF2B5EF4-FFF2-40B4-BE49-F238E27FC236}">
+                <a16:creationId xmlns:a16="http://schemas.microsoft.com/office/drawing/2014/main" id="{C82F752C-7420-FD33-75AF-95A9FFE16C3E}"/>
+              </a:ext>
+            </a:extLst>
+          </p:cNvPr>
+          <p:cNvCxnSpPr>
+            <a:cxnSpLocks/>
+            <a:stCxn id="11" idx="3"/>
+            <a:endCxn id="8" idx="3"/>
+          </p:cNvCxnSpPr>
+          <p:nvPr/>
+        </p:nvCxnSpPr>
+        <p:spPr>
+          <a:xfrm flipV="1">
+            <a:off x="3177514" y="3978020"/>
+            <a:ext cx="1442813" cy="1061926"/>
+          </a:xfrm>
+          <a:prstGeom prst="straightConnector1">
+            <a:avLst/>
+          </a:prstGeom>
+          <a:ln w="76200">
+            <a:solidFill>
+              <a:schemeClr val="accent6">
+                <a:lumMod val="60000"/>
+                <a:lumOff val="40000"/>
+              </a:schemeClr>
+            </a:solidFill>
+            <a:tailEnd type="triangle"/>
+          </a:ln>
+        </p:spPr>
+        <p:style>
+          <a:lnRef idx="2">
+            <a:schemeClr val="accent1"/>
+          </a:lnRef>
+          <a:fillRef idx="0">
+            <a:schemeClr val="accent1"/>
+          </a:fillRef>
+          <a:effectRef idx="1">
+            <a:schemeClr val="accent1"/>
+          </a:effectRef>
+          <a:fontRef idx="minor">
+            <a:schemeClr val="tx1"/>
+          </a:fontRef>
+        </p:style>
+      </p:cxnSp>
+      <p:sp>
+        <p:nvSpPr>
+          <p:cNvPr id="29" name="TextBox 28">
+            <a:extLst>
+              <a:ext uri="{FF2B5EF4-FFF2-40B4-BE49-F238E27FC236}">
+                <a16:creationId xmlns:a16="http://schemas.microsoft.com/office/drawing/2014/main" id="{0D7CF29C-E35B-9675-FAD1-9E0780A4A0FF}"/>
+              </a:ext>
+            </a:extLst>
+          </p:cNvPr>
+          <p:cNvSpPr txBox="1"/>
+          <p:nvPr/>
+        </p:nvSpPr>
+        <p:spPr>
+          <a:xfrm>
+            <a:off x="3450805" y="2042014"/>
+            <a:ext cx="2339043" cy="646331"/>
+          </a:xfrm>
+          <a:prstGeom prst="rect">
+            <a:avLst/>
+          </a:prstGeom>
+          <a:noFill/>
+          <a:ln>
+            <a:noFill/>
+          </a:ln>
+        </p:spPr>
+        <p:txBody>
+          <a:bodyPr wrap="square" rtlCol="0">
+            <a:spAutoFit/>
+          </a:bodyPr>
+          <a:lstStyle/>
+          <a:p>
+            <a:r>
+              <a:rPr lang="en-GB" sz="3600" b="1" i="1" dirty="0">
+                <a:solidFill>
+                  <a:schemeClr val="accent1"/>
+                </a:solidFill>
+              </a:rPr>
+              <a:t>Flow 1</a:t>
+            </a:r>
+          </a:p>
+        </p:txBody>
+      </p:sp>
+      <p:sp>
+        <p:nvSpPr>
+          <p:cNvPr id="34" name="TextBox 33">
+            <a:extLst>
+              <a:ext uri="{FF2B5EF4-FFF2-40B4-BE49-F238E27FC236}">
+                <a16:creationId xmlns:a16="http://schemas.microsoft.com/office/drawing/2014/main" id="{9238F317-46F9-FEFF-5811-8544BA37814D}"/>
+              </a:ext>
+            </a:extLst>
+          </p:cNvPr>
+          <p:cNvSpPr txBox="1"/>
+          <p:nvPr/>
+        </p:nvSpPr>
+        <p:spPr>
+          <a:xfrm>
+            <a:off x="3450805" y="4975196"/>
+            <a:ext cx="2339043" cy="646331"/>
+          </a:xfrm>
+          <a:prstGeom prst="rect">
+            <a:avLst/>
+          </a:prstGeom>
+          <a:noFill/>
+          <a:ln>
+            <a:noFill/>
+          </a:ln>
+        </p:spPr>
+        <p:txBody>
+          <a:bodyPr wrap="square" rtlCol="0">
+            <a:spAutoFit/>
+          </a:bodyPr>
+          <a:lstStyle/>
+          <a:p>
+            <a:r>
+              <a:rPr lang="en-GB" sz="3600" b="1" i="1" dirty="0">
+                <a:solidFill>
+                  <a:schemeClr val="accent6">
+                    <a:lumMod val="60000"/>
+                    <a:lumOff val="40000"/>
+                  </a:schemeClr>
+                </a:solidFill>
+              </a:rPr>
+              <a:t>Flow 2</a:t>
+            </a:r>
+          </a:p>
+        </p:txBody>
+      </p:sp>
+    </p:spTree>
+    <p:extLst>
+      <p:ext uri="{BB962C8B-B14F-4D97-AF65-F5344CB8AC3E}">
+        <p14:creationId xmlns:p14="http://schemas.microsoft.com/office/powerpoint/2010/main" val="2018850004"/>
       </p:ext>
     </p:extLst>
   </p:cSld>

</xml_diff>